<commit_message>
Fix conditions in block diagrams for tasks 3.1 and 3.2
</commit_message>
<xml_diff>
--- a/lab_3/task_1/task_1.pptx
+++ b/lab_3/task_1/task_1.pptx
@@ -245,7 +245,7 @@
           <a:p>
             <a:fld id="{E620D1FC-2253-9541-B174-ECE369BAD33E}" type="datetimeFigureOut">
               <a:rPr lang="pl-PL" smtClean="0"/>
-              <a:t>1.01.2026</a:t>
+              <a:t>2.01.2026</a:t>
             </a:fld>
             <a:endParaRPr lang="pl-PL"/>
           </a:p>
@@ -415,7 +415,7 @@
           <a:p>
             <a:fld id="{E620D1FC-2253-9541-B174-ECE369BAD33E}" type="datetimeFigureOut">
               <a:rPr lang="pl-PL" smtClean="0"/>
-              <a:t>1.01.2026</a:t>
+              <a:t>2.01.2026</a:t>
             </a:fld>
             <a:endParaRPr lang="pl-PL"/>
           </a:p>
@@ -595,7 +595,7 @@
           <a:p>
             <a:fld id="{E620D1FC-2253-9541-B174-ECE369BAD33E}" type="datetimeFigureOut">
               <a:rPr lang="pl-PL" smtClean="0"/>
-              <a:t>1.01.2026</a:t>
+              <a:t>2.01.2026</a:t>
             </a:fld>
             <a:endParaRPr lang="pl-PL"/>
           </a:p>
@@ -765,7 +765,7 @@
           <a:p>
             <a:fld id="{E620D1FC-2253-9541-B174-ECE369BAD33E}" type="datetimeFigureOut">
               <a:rPr lang="pl-PL" smtClean="0"/>
-              <a:t>1.01.2026</a:t>
+              <a:t>2.01.2026</a:t>
             </a:fld>
             <a:endParaRPr lang="pl-PL"/>
           </a:p>
@@ -1011,7 +1011,7 @@
           <a:p>
             <a:fld id="{E620D1FC-2253-9541-B174-ECE369BAD33E}" type="datetimeFigureOut">
               <a:rPr lang="pl-PL" smtClean="0"/>
-              <a:t>1.01.2026</a:t>
+              <a:t>2.01.2026</a:t>
             </a:fld>
             <a:endParaRPr lang="pl-PL"/>
           </a:p>
@@ -1243,7 +1243,7 @@
           <a:p>
             <a:fld id="{E620D1FC-2253-9541-B174-ECE369BAD33E}" type="datetimeFigureOut">
               <a:rPr lang="pl-PL" smtClean="0"/>
-              <a:t>1.01.2026</a:t>
+              <a:t>2.01.2026</a:t>
             </a:fld>
             <a:endParaRPr lang="pl-PL"/>
           </a:p>
@@ -1610,7 +1610,7 @@
           <a:p>
             <a:fld id="{E620D1FC-2253-9541-B174-ECE369BAD33E}" type="datetimeFigureOut">
               <a:rPr lang="pl-PL" smtClean="0"/>
-              <a:t>1.01.2026</a:t>
+              <a:t>2.01.2026</a:t>
             </a:fld>
             <a:endParaRPr lang="pl-PL"/>
           </a:p>
@@ -1728,7 +1728,7 @@
           <a:p>
             <a:fld id="{E620D1FC-2253-9541-B174-ECE369BAD33E}" type="datetimeFigureOut">
               <a:rPr lang="pl-PL" smtClean="0"/>
-              <a:t>1.01.2026</a:t>
+              <a:t>2.01.2026</a:t>
             </a:fld>
             <a:endParaRPr lang="pl-PL"/>
           </a:p>
@@ -1823,7 +1823,7 @@
           <a:p>
             <a:fld id="{E620D1FC-2253-9541-B174-ECE369BAD33E}" type="datetimeFigureOut">
               <a:rPr lang="pl-PL" smtClean="0"/>
-              <a:t>1.01.2026</a:t>
+              <a:t>2.01.2026</a:t>
             </a:fld>
             <a:endParaRPr lang="pl-PL"/>
           </a:p>
@@ -2100,7 +2100,7 @@
           <a:p>
             <a:fld id="{E620D1FC-2253-9541-B174-ECE369BAD33E}" type="datetimeFigureOut">
               <a:rPr lang="pl-PL" smtClean="0"/>
-              <a:t>1.01.2026</a:t>
+              <a:t>2.01.2026</a:t>
             </a:fld>
             <a:endParaRPr lang="pl-PL"/>
           </a:p>
@@ -2357,7 +2357,7 @@
           <a:p>
             <a:fld id="{E620D1FC-2253-9541-B174-ECE369BAD33E}" type="datetimeFigureOut">
               <a:rPr lang="pl-PL" smtClean="0"/>
-              <a:t>1.01.2026</a:t>
+              <a:t>2.01.2026</a:t>
             </a:fld>
             <a:endParaRPr lang="pl-PL"/>
           </a:p>
@@ -2570,7 +2570,7 @@
           <a:p>
             <a:fld id="{E620D1FC-2253-9541-B174-ECE369BAD33E}" type="datetimeFigureOut">
               <a:rPr lang="pl-PL" smtClean="0"/>
-              <a:t>1.01.2026</a:t>
+              <a:t>2.01.2026</a:t>
             </a:fld>
             <a:endParaRPr lang="pl-PL"/>
           </a:p>
@@ -4383,7 +4383,7 @@
             </a:r>
             <a:r>
               <a:rPr lang="pl-PL" sz="900" dirty="0"/>
-              <a:t> &gt; 1</a:t>
+              <a:t> &gt;= 1</a:t>
             </a:r>
             <a:endParaRPr lang="pl-PL" sz="900" i="1" dirty="0"/>
           </a:p>
@@ -5239,8 +5239,12 @@
               <a:t>size</a:t>
             </a:r>
             <a:r>
+              <a:rPr lang="pl-PL" sz="900"/>
+              <a:t> &gt;= </a:t>
+            </a:r>
+            <a:r>
               <a:rPr lang="pl-PL" sz="900" dirty="0"/>
-              <a:t> &gt; 1</a:t>
+              <a:t>1</a:t>
             </a:r>
             <a:endParaRPr lang="pl-PL" sz="900" i="1" dirty="0"/>
           </a:p>

</xml_diff>